<commit_message>
Change High Level Design
</commit_message>
<xml_diff>
--- a/프레젠테이션1.pptx
+++ b/프레젠테이션1.pptx
@@ -259,7 +259,7 @@
           <a:p>
             <a:fld id="{341866D5-F9A3-41FF-B35B-996BB2E0AFF1}" type="datetimeFigureOut">
               <a:rPr lang="ko-KR" altLang="en-US" smtClean="0"/>
-              <a:t>2021-10-25</a:t>
+              <a:t>2021-10-30</a:t>
             </a:fld>
             <a:endParaRPr lang="ko-KR" altLang="en-US"/>
           </a:p>
@@ -457,7 +457,7 @@
           <a:p>
             <a:fld id="{341866D5-F9A3-41FF-B35B-996BB2E0AFF1}" type="datetimeFigureOut">
               <a:rPr lang="ko-KR" altLang="en-US" smtClean="0"/>
-              <a:t>2021-10-25</a:t>
+              <a:t>2021-10-30</a:t>
             </a:fld>
             <a:endParaRPr lang="ko-KR" altLang="en-US"/>
           </a:p>
@@ -665,7 +665,7 @@
           <a:p>
             <a:fld id="{341866D5-F9A3-41FF-B35B-996BB2E0AFF1}" type="datetimeFigureOut">
               <a:rPr lang="ko-KR" altLang="en-US" smtClean="0"/>
-              <a:t>2021-10-25</a:t>
+              <a:t>2021-10-30</a:t>
             </a:fld>
             <a:endParaRPr lang="ko-KR" altLang="en-US"/>
           </a:p>
@@ -863,7 +863,7 @@
           <a:p>
             <a:fld id="{341866D5-F9A3-41FF-B35B-996BB2E0AFF1}" type="datetimeFigureOut">
               <a:rPr lang="ko-KR" altLang="en-US" smtClean="0"/>
-              <a:t>2021-10-25</a:t>
+              <a:t>2021-10-30</a:t>
             </a:fld>
             <a:endParaRPr lang="ko-KR" altLang="en-US"/>
           </a:p>
@@ -1138,7 +1138,7 @@
           <a:p>
             <a:fld id="{341866D5-F9A3-41FF-B35B-996BB2E0AFF1}" type="datetimeFigureOut">
               <a:rPr lang="ko-KR" altLang="en-US" smtClean="0"/>
-              <a:t>2021-10-25</a:t>
+              <a:t>2021-10-30</a:t>
             </a:fld>
             <a:endParaRPr lang="ko-KR" altLang="en-US"/>
           </a:p>
@@ -1403,7 +1403,7 @@
           <a:p>
             <a:fld id="{341866D5-F9A3-41FF-B35B-996BB2E0AFF1}" type="datetimeFigureOut">
               <a:rPr lang="ko-KR" altLang="en-US" smtClean="0"/>
-              <a:t>2021-10-25</a:t>
+              <a:t>2021-10-30</a:t>
             </a:fld>
             <a:endParaRPr lang="ko-KR" altLang="en-US"/>
           </a:p>
@@ -1815,7 +1815,7 @@
           <a:p>
             <a:fld id="{341866D5-F9A3-41FF-B35B-996BB2E0AFF1}" type="datetimeFigureOut">
               <a:rPr lang="ko-KR" altLang="en-US" smtClean="0"/>
-              <a:t>2021-10-25</a:t>
+              <a:t>2021-10-30</a:t>
             </a:fld>
             <a:endParaRPr lang="ko-KR" altLang="en-US"/>
           </a:p>
@@ -1956,7 +1956,7 @@
           <a:p>
             <a:fld id="{341866D5-F9A3-41FF-B35B-996BB2E0AFF1}" type="datetimeFigureOut">
               <a:rPr lang="ko-KR" altLang="en-US" smtClean="0"/>
-              <a:t>2021-10-25</a:t>
+              <a:t>2021-10-30</a:t>
             </a:fld>
             <a:endParaRPr lang="ko-KR" altLang="en-US"/>
           </a:p>
@@ -2069,7 +2069,7 @@
           <a:p>
             <a:fld id="{341866D5-F9A3-41FF-B35B-996BB2E0AFF1}" type="datetimeFigureOut">
               <a:rPr lang="ko-KR" altLang="en-US" smtClean="0"/>
-              <a:t>2021-10-25</a:t>
+              <a:t>2021-10-30</a:t>
             </a:fld>
             <a:endParaRPr lang="ko-KR" altLang="en-US"/>
           </a:p>
@@ -2380,7 +2380,7 @@
           <a:p>
             <a:fld id="{341866D5-F9A3-41FF-B35B-996BB2E0AFF1}" type="datetimeFigureOut">
               <a:rPr lang="ko-KR" altLang="en-US" smtClean="0"/>
-              <a:t>2021-10-25</a:t>
+              <a:t>2021-10-30</a:t>
             </a:fld>
             <a:endParaRPr lang="ko-KR" altLang="en-US"/>
           </a:p>
@@ -2668,7 +2668,7 @@
           <a:p>
             <a:fld id="{341866D5-F9A3-41FF-B35B-996BB2E0AFF1}" type="datetimeFigureOut">
               <a:rPr lang="ko-KR" altLang="en-US" smtClean="0"/>
-              <a:t>2021-10-25</a:t>
+              <a:t>2021-10-30</a:t>
             </a:fld>
             <a:endParaRPr lang="ko-KR" altLang="en-US"/>
           </a:p>
@@ -2909,7 +2909,7 @@
           <a:p>
             <a:fld id="{341866D5-F9A3-41FF-B35B-996BB2E0AFF1}" type="datetimeFigureOut">
               <a:rPr lang="ko-KR" altLang="en-US" smtClean="0"/>
-              <a:t>2021-10-25</a:t>
+              <a:t>2021-10-30</a:t>
             </a:fld>
             <a:endParaRPr lang="ko-KR" altLang="en-US"/>
           </a:p>
@@ -3570,7 +3570,7 @@
             <a:pPr algn="ctr"/>
             <a:r>
               <a:rPr lang="en-US" altLang="ko-KR" sz="1000" b="1" dirty="0"/>
-              <a:t>Process Packet &amp; Update</a:t>
+              <a:t>Process Packet() &amp; Update()</a:t>
             </a:r>
             <a:endParaRPr lang="ko-KR" altLang="en-US" sz="1000" b="1" dirty="0"/>
           </a:p>
@@ -3820,7 +3820,7 @@
             <a:pPr algn="ctr"/>
             <a:r>
               <a:rPr lang="en-US" altLang="ko-KR" sz="1000" b="1" dirty="0"/>
-              <a:t>Send Packet</a:t>
+              <a:t>Send Packet()</a:t>
             </a:r>
           </a:p>
           <a:p>
@@ -3843,6 +3843,13 @@
             <a:r>
               <a:rPr lang="en-US" altLang="ko-KR" sz="1000" b="1" dirty="0"/>
               <a:t>(Player Move)</a:t>
+            </a:r>
+          </a:p>
+          <a:p>
+            <a:pPr algn="ctr"/>
+            <a:r>
+              <a:rPr lang="en-US" altLang="ko-KR" sz="1000" b="1" dirty="0"/>
+              <a:t>(Item)</a:t>
             </a:r>
           </a:p>
           <a:p>
@@ -4794,8 +4801,8 @@
         </p:nvSpPr>
         <p:spPr>
           <a:xfrm>
-            <a:off x="9538747" y="4392965"/>
-            <a:ext cx="1440000" cy="450000"/>
+            <a:off x="9538747" y="4392964"/>
+            <a:ext cx="1440000" cy="482109"/>
           </a:xfrm>
           <a:prstGeom prst="roundRect">
             <a:avLst/>
@@ -4826,6 +4833,28 @@
               <a:rPr lang="en-US" altLang="ko-KR" sz="1000" b="1" dirty="0"/>
               <a:t>Process Packet()</a:t>
             </a:r>
+          </a:p>
+          <a:p>
+            <a:pPr algn="ctr"/>
+            <a:r>
+              <a:rPr lang="en-US" altLang="ko-KR" sz="1000" b="1" dirty="0"/>
+              <a:t>Send</a:t>
+            </a:r>
+            <a:r>
+              <a:rPr lang="ko-KR" altLang="en-US" sz="1000" b="1" dirty="0"/>
+              <a:t> </a:t>
+            </a:r>
+            <a:r>
+              <a:rPr lang="en-US" altLang="ko-KR" sz="1000" b="1" dirty="0"/>
+              <a:t>Packet()</a:t>
+            </a:r>
+          </a:p>
+          <a:p>
+            <a:pPr algn="ctr"/>
+            <a:r>
+              <a:rPr lang="en-US" altLang="ko-KR" sz="1000" b="1" dirty="0"/>
+              <a:t>(Move, item)</a:t>
+            </a:r>
             <a:endParaRPr lang="ko-KR" altLang="en-US" sz="1000" b="1" dirty="0"/>
           </a:p>
         </p:txBody>
@@ -4849,7 +4878,7 @@
         <p:spPr>
           <a:xfrm>
             <a:off x="10258747" y="3914858"/>
-            <a:ext cx="0" cy="478107"/>
+            <a:ext cx="0" cy="478106"/>
           </a:xfrm>
           <a:prstGeom prst="straightConnector1">
             <a:avLst/>
@@ -4892,7 +4921,7 @@
         <p:spPr>
           <a:xfrm rot="10800000" flipH="1">
             <a:off x="9538747" y="3689859"/>
-            <a:ext cx="112500" cy="928107"/>
+            <a:ext cx="112500" cy="944161"/>
           </a:xfrm>
           <a:prstGeom prst="bentConnector3">
             <a:avLst>
@@ -5328,14 +5357,14 @@
             <a:pPr algn="ctr"/>
             <a:r>
               <a:rPr lang="en-US" altLang="ko-KR" sz="1000" b="1" dirty="0"/>
-              <a:t>Send Packet</a:t>
+              <a:t>Send Packet()</a:t>
             </a:r>
           </a:p>
           <a:p>
             <a:pPr algn="ctr"/>
             <a:r>
               <a:rPr lang="en-US" altLang="ko-KR" sz="1000" b="1" dirty="0"/>
-              <a:t>(Move, Hit, item)</a:t>
+              <a:t>(Bullet Move)</a:t>
             </a:r>
           </a:p>
         </p:txBody>
@@ -5959,6 +5988,7 @@
             </a:extLst>
           </p:cNvPr>
           <p:cNvCxnSpPr>
+            <a:cxnSpLocks/>
             <a:stCxn id="346" idx="3"/>
             <a:endCxn id="170" idx="3"/>
           </p:cNvCxnSpPr>
@@ -5967,7 +5997,7 @@
         <p:spPr>
           <a:xfrm flipH="1">
             <a:off x="10978747" y="1487048"/>
-            <a:ext cx="414926" cy="3130917"/>
+            <a:ext cx="414926" cy="3146971"/>
           </a:xfrm>
           <a:prstGeom prst="bentConnector3">
             <a:avLst>

</xml_diff>